<commit_message>
Edit existing model class diagram and add Task class implementation section (#72)
</commit_message>
<xml_diff>
--- a/docs/diagrams/ModelComponentClassDiagram.pptx
+++ b/docs/diagrams/ModelComponentClassDiagram.pptx
@@ -208,7 +208,7 @@
           <a:p>
             <a:fld id="{F5CC4B3F-88C1-4FFA-B1B6-F41C21DC6924}" type="datetimeFigureOut">
               <a:rPr lang="en-US" smtClean="0"/>
-              <a:t>6/27/2018</a:t>
+              <a:t>10/18/2018</a:t>
             </a:fld>
             <a:endParaRPr lang="en-US"/>
           </a:p>
@@ -654,7 +654,7 @@
           <a:p>
             <a:fld id="{78C97017-6FC3-485B-9764-EAC9E56C1D49}" type="datetimeFigureOut">
               <a:rPr lang="en-US" smtClean="0"/>
-              <a:t>6/27/2018</a:t>
+              <a:t>10/18/2018</a:t>
             </a:fld>
             <a:endParaRPr lang="en-US"/>
           </a:p>
@@ -822,7 +822,7 @@
           <a:p>
             <a:fld id="{78C97017-6FC3-485B-9764-EAC9E56C1D49}" type="datetimeFigureOut">
               <a:rPr lang="en-US" smtClean="0"/>
-              <a:t>6/27/2018</a:t>
+              <a:t>10/18/2018</a:t>
             </a:fld>
             <a:endParaRPr lang="en-US"/>
           </a:p>
@@ -1000,7 +1000,7 @@
           <a:p>
             <a:fld id="{78C97017-6FC3-485B-9764-EAC9E56C1D49}" type="datetimeFigureOut">
               <a:rPr lang="en-US" smtClean="0"/>
-              <a:t>6/27/2018</a:t>
+              <a:t>10/18/2018</a:t>
             </a:fld>
             <a:endParaRPr lang="en-US"/>
           </a:p>
@@ -1168,7 +1168,7 @@
           <a:p>
             <a:fld id="{78C97017-6FC3-485B-9764-EAC9E56C1D49}" type="datetimeFigureOut">
               <a:rPr lang="en-US" smtClean="0"/>
-              <a:t>6/27/2018</a:t>
+              <a:t>10/18/2018</a:t>
             </a:fld>
             <a:endParaRPr lang="en-US"/>
           </a:p>
@@ -1413,7 +1413,7 @@
           <a:p>
             <a:fld id="{78C97017-6FC3-485B-9764-EAC9E56C1D49}" type="datetimeFigureOut">
               <a:rPr lang="en-US" smtClean="0"/>
-              <a:t>6/27/2018</a:t>
+              <a:t>10/18/2018</a:t>
             </a:fld>
             <a:endParaRPr lang="en-US"/>
           </a:p>
@@ -1698,7 +1698,7 @@
           <a:p>
             <a:fld id="{78C97017-6FC3-485B-9764-EAC9E56C1D49}" type="datetimeFigureOut">
               <a:rPr lang="en-US" smtClean="0"/>
-              <a:t>6/27/2018</a:t>
+              <a:t>10/18/2018</a:t>
             </a:fld>
             <a:endParaRPr lang="en-US"/>
           </a:p>
@@ -2117,7 +2117,7 @@
           <a:p>
             <a:fld id="{78C97017-6FC3-485B-9764-EAC9E56C1D49}" type="datetimeFigureOut">
               <a:rPr lang="en-US" smtClean="0"/>
-              <a:t>6/27/2018</a:t>
+              <a:t>10/18/2018</a:t>
             </a:fld>
             <a:endParaRPr lang="en-US"/>
           </a:p>
@@ -2234,7 +2234,7 @@
           <a:p>
             <a:fld id="{78C97017-6FC3-485B-9764-EAC9E56C1D49}" type="datetimeFigureOut">
               <a:rPr lang="en-US" smtClean="0"/>
-              <a:t>6/27/2018</a:t>
+              <a:t>10/18/2018</a:t>
             </a:fld>
             <a:endParaRPr lang="en-US"/>
           </a:p>
@@ -2329,7 +2329,7 @@
           <a:p>
             <a:fld id="{78C97017-6FC3-485B-9764-EAC9E56C1D49}" type="datetimeFigureOut">
               <a:rPr lang="en-US" smtClean="0"/>
-              <a:t>6/27/2018</a:t>
+              <a:t>10/18/2018</a:t>
             </a:fld>
             <a:endParaRPr lang="en-US"/>
           </a:p>
@@ -2604,7 +2604,7 @@
           <a:p>
             <a:fld id="{78C97017-6FC3-485B-9764-EAC9E56C1D49}" type="datetimeFigureOut">
               <a:rPr lang="en-US" smtClean="0"/>
-              <a:t>6/27/2018</a:t>
+              <a:t>10/18/2018</a:t>
             </a:fld>
             <a:endParaRPr lang="en-US"/>
           </a:p>
@@ -2856,7 +2856,7 @@
           <a:p>
             <a:fld id="{78C97017-6FC3-485B-9764-EAC9E56C1D49}" type="datetimeFigureOut">
               <a:rPr lang="en-US" smtClean="0"/>
-              <a:t>6/27/2018</a:t>
+              <a:t>10/18/2018</a:t>
             </a:fld>
             <a:endParaRPr lang="en-US"/>
           </a:p>
@@ -3067,7 +3067,7 @@
           <a:p>
             <a:fld id="{78C97017-6FC3-485B-9764-EAC9E56C1D49}" type="datetimeFigureOut">
               <a:rPr lang="en-US" smtClean="0"/>
-              <a:t>6/27/2018</a:t>
+              <a:t>10/18/2018</a:t>
             </a:fld>
             <a:endParaRPr lang="en-US"/>
           </a:p>
@@ -3632,13 +3632,13 @@
           <p:nvPr/>
         </p:nvCxnSpPr>
         <p:spPr>
-          <a:xfrm rot="5400000" flipH="1" flipV="1">
-            <a:off x="4131507" y="1281685"/>
-            <a:ext cx="613122" cy="4459404"/>
+          <a:xfrm rot="16200000" flipH="1">
+            <a:off x="4423139" y="1603175"/>
+            <a:ext cx="29859" cy="4459404"/>
           </a:xfrm>
           <a:prstGeom prst="bentConnector3">
             <a:avLst>
-              <a:gd name="adj1" fmla="val -26668"/>
+              <a:gd name="adj1" fmla="val 865598"/>
             </a:avLst>
           </a:prstGeom>
           <a:ln w="19050">
@@ -3994,7 +3994,7 @@
           <a:p>
             <a:pPr algn="ctr"/>
             <a:r>
-              <a:rPr lang="en-US" sz="1050" dirty="0" err="1" smtClean="0">
+              <a:rPr lang="en-US" sz="1050" dirty="0" err="1">
                 <a:solidFill>
                   <a:srgbClr val="7030A0"/>
                 </a:solidFill>
@@ -4103,7 +4103,7 @@
         </p:nvSpPr>
         <p:spPr>
           <a:xfrm>
-            <a:off x="4692650" y="2846162"/>
+            <a:off x="4692650" y="3489143"/>
             <a:ext cx="1156969" cy="346760"/>
           </a:xfrm>
           <a:prstGeom prst="rect">
@@ -4206,7 +4206,7 @@
         </p:nvSpPr>
         <p:spPr>
           <a:xfrm>
-            <a:off x="6313677" y="2858066"/>
+            <a:off x="6313677" y="3501047"/>
             <a:ext cx="708186" cy="346760"/>
           </a:xfrm>
           <a:prstGeom prst="rect">
@@ -4262,7 +4262,7 @@
         </p:nvSpPr>
         <p:spPr>
           <a:xfrm>
-            <a:off x="5858751" y="2941676"/>
+            <a:off x="5858751" y="3584657"/>
             <a:ext cx="236048" cy="173380"/>
           </a:xfrm>
           <a:prstGeom prst="flowChartDecision">
@@ -4310,7 +4310,7 @@
         </p:nvCxnSpPr>
         <p:spPr>
           <a:xfrm>
-            <a:off x="6094799" y="3028366"/>
+            <a:off x="6094799" y="3671347"/>
             <a:ext cx="218878" cy="3080"/>
           </a:xfrm>
           <a:prstGeom prst="bentConnector3">
@@ -4348,8 +4348,8 @@
         </p:nvSpPr>
         <p:spPr>
           <a:xfrm>
-            <a:off x="7712397" y="2564238"/>
-            <a:ext cx="708186" cy="285783"/>
+            <a:off x="7712396" y="3207219"/>
+            <a:ext cx="749545" cy="285783"/>
           </a:xfrm>
           <a:prstGeom prst="rect">
             <a:avLst/>
@@ -4404,7 +4404,7 @@
         </p:nvSpPr>
         <p:spPr>
           <a:xfrm>
-            <a:off x="7041947" y="2948201"/>
+            <a:off x="7041947" y="3591182"/>
             <a:ext cx="236048" cy="173380"/>
           </a:xfrm>
           <a:prstGeom prst="flowChartDecision">
@@ -4453,7 +4453,7 @@
         </p:nvCxnSpPr>
         <p:spPr>
           <a:xfrm flipV="1">
-            <a:off x="7277995" y="2706821"/>
+            <a:off x="7277995" y="3349802"/>
             <a:ext cx="434402" cy="327761"/>
           </a:xfrm>
           <a:prstGeom prst="bentConnector3">
@@ -4491,8 +4491,8 @@
         </p:nvSpPr>
         <p:spPr>
           <a:xfrm>
-            <a:off x="7712397" y="2887216"/>
-            <a:ext cx="708186" cy="285783"/>
+            <a:off x="7712396" y="3530197"/>
+            <a:ext cx="749545" cy="285783"/>
           </a:xfrm>
           <a:prstGeom prst="rect">
             <a:avLst/>
@@ -4543,6 +4543,7 @@
         <p:nvCxnSpPr>
           <p:cNvPr id="81" name="Elbow Connector 80"/>
           <p:cNvCxnSpPr>
+            <a:cxnSpLocks/>
             <a:stCxn id="78" idx="3"/>
             <a:endCxn id="80" idx="1"/>
           </p:cNvCxnSpPr>
@@ -4550,8 +4551,8 @@
         </p:nvCxnSpPr>
         <p:spPr>
           <a:xfrm flipV="1">
-            <a:off x="7277995" y="3030108"/>
-            <a:ext cx="434402" cy="4783"/>
+            <a:off x="7277995" y="3673089"/>
+            <a:ext cx="434401" cy="4783"/>
           </a:xfrm>
           <a:prstGeom prst="bentConnector3">
             <a:avLst/>
@@ -4588,8 +4589,8 @@
         </p:nvSpPr>
         <p:spPr>
           <a:xfrm>
-            <a:off x="7712397" y="3210194"/>
-            <a:ext cx="708186" cy="285783"/>
+            <a:off x="7712396" y="3853175"/>
+            <a:ext cx="749545" cy="285783"/>
           </a:xfrm>
           <a:prstGeom prst="rect">
             <a:avLst/>
@@ -4640,6 +4641,7 @@
         <p:nvCxnSpPr>
           <p:cNvPr id="84" name="Elbow Connector 83"/>
           <p:cNvCxnSpPr>
+            <a:cxnSpLocks/>
             <a:stCxn id="78" idx="3"/>
             <a:endCxn id="83" idx="1"/>
           </p:cNvCxnSpPr>
@@ -4647,8 +4649,8 @@
         </p:nvCxnSpPr>
         <p:spPr>
           <a:xfrm>
-            <a:off x="7277995" y="3034891"/>
-            <a:ext cx="434402" cy="318195"/>
+            <a:off x="7277995" y="3677872"/>
+            <a:ext cx="434401" cy="318195"/>
           </a:xfrm>
           <a:prstGeom prst="bentConnector3">
             <a:avLst/>
@@ -4685,8 +4687,8 @@
         </p:nvSpPr>
         <p:spPr>
           <a:xfrm>
-            <a:off x="7712397" y="3533171"/>
-            <a:ext cx="708186" cy="285783"/>
+            <a:off x="7712396" y="4176152"/>
+            <a:ext cx="749545" cy="285783"/>
           </a:xfrm>
           <a:prstGeom prst="rect">
             <a:avLst/>
@@ -4737,6 +4739,7 @@
         <p:nvCxnSpPr>
           <p:cNvPr id="86" name="Elbow Connector 85"/>
           <p:cNvCxnSpPr>
+            <a:cxnSpLocks/>
             <a:stCxn id="78" idx="3"/>
             <a:endCxn id="85" idx="1"/>
           </p:cNvCxnSpPr>
@@ -4744,8 +4747,8 @@
         </p:nvCxnSpPr>
         <p:spPr>
           <a:xfrm>
-            <a:off x="7277995" y="3034891"/>
-            <a:ext cx="434402" cy="641172"/>
+            <a:off x="7277995" y="3677872"/>
+            <a:ext cx="434401" cy="641172"/>
           </a:xfrm>
           <a:prstGeom prst="bentConnector3">
             <a:avLst/>
@@ -4944,7 +4947,7 @@
         </p:nvSpPr>
         <p:spPr>
           <a:xfrm rot="16200000">
-            <a:off x="6362886" y="3586305"/>
+            <a:off x="6362886" y="4229286"/>
             <a:ext cx="881018" cy="261610"/>
           </a:xfrm>
           <a:prstGeom prst="rect">
@@ -5023,14 +5026,6 @@
               </a:rPr>
               <a:t>&lt;&lt;interface&gt;&gt;</a:t>
             </a:r>
-            <a:r>
-              <a:rPr lang="en-US" sz="1050">
-                <a:solidFill>
-                  <a:srgbClr val="7030A0"/>
-                </a:solidFill>
-              </a:rPr>
-              <a:t/>
-            </a:r>
             <a:br>
               <a:rPr lang="en-US" sz="1050">
                 <a:solidFill>
@@ -5143,7 +5138,7 @@
         </p:nvSpPr>
         <p:spPr>
           <a:xfrm>
-            <a:off x="6135256" y="3097917"/>
+            <a:off x="6135256" y="3740898"/>
             <a:ext cx="189257" cy="178683"/>
           </a:xfrm>
           <a:prstGeom prst="rect">
@@ -5260,7 +5255,7 @@
         </p:nvSpPr>
         <p:spPr>
           <a:xfrm>
-            <a:off x="6449896" y="3204826"/>
+            <a:off x="6449896" y="3847807"/>
             <a:ext cx="189257" cy="178683"/>
           </a:xfrm>
           <a:prstGeom prst="rect">
@@ -5305,8 +5300,8 @@
         </p:nvSpPr>
         <p:spPr>
           <a:xfrm>
-            <a:off x="7712397" y="2228817"/>
-            <a:ext cx="708186" cy="285783"/>
+            <a:off x="7712396" y="2871798"/>
+            <a:ext cx="749545" cy="285783"/>
           </a:xfrm>
           <a:prstGeom prst="rect">
             <a:avLst/>
@@ -5371,8 +5366,8 @@
         </p:nvCxnSpPr>
         <p:spPr>
           <a:xfrm flipV="1">
-            <a:off x="7277995" y="2371709"/>
-            <a:ext cx="434402" cy="663182"/>
+            <a:off x="7277995" y="3014690"/>
+            <a:ext cx="434401" cy="663182"/>
           </a:xfrm>
           <a:prstGeom prst="bentConnector3">
             <a:avLst>
@@ -5417,7 +5412,7 @@
         </p:nvSpPr>
         <p:spPr>
           <a:xfrm>
-            <a:off x="7466243" y="2255711"/>
+            <a:off x="7466243" y="2898692"/>
             <a:ext cx="189257" cy="178683"/>
           </a:xfrm>
           <a:prstGeom prst="rect">
@@ -5508,17 +5503,17 @@
         <p:nvCxnSpPr>
           <p:cNvPr id="60" name="Straight Arrow Connector 59"/>
           <p:cNvCxnSpPr>
-            <a:stCxn id="51" idx="1"/>
+            <a:cxnSpLocks/>
             <a:endCxn id="49" idx="1"/>
           </p:cNvCxnSpPr>
           <p:nvPr/>
         </p:nvCxnSpPr>
         <p:spPr>
-          <a:xfrm>
-            <a:off x="4324972" y="3007222"/>
-            <a:ext cx="367678" cy="12320"/>
-          </a:xfrm>
-          <a:prstGeom prst="straightConnector1">
+          <a:xfrm rot="16200000" flipH="1">
+            <a:off x="4285792" y="3255665"/>
+            <a:ext cx="551044" cy="262671"/>
+          </a:xfrm>
+          <a:prstGeom prst="bentConnector2">
             <a:avLst/>
           </a:prstGeom>
           <a:ln w="19050">
@@ -5641,6 +5636,887 @@
           </a:fontRef>
         </p:style>
       </p:cxnSp>
+      <p:sp>
+        <p:nvSpPr>
+          <p:cNvPr id="56" name="Rectangle 8">
+            <a:extLst>
+              <a:ext uri="{FF2B5EF4-FFF2-40B4-BE49-F238E27FC236}">
+                <a16:creationId xmlns:a16="http://schemas.microsoft.com/office/drawing/2014/main" id="{B59E5FCA-9252-4C77-8908-DBA92709B91C}"/>
+              </a:ext>
+            </a:extLst>
+          </p:cNvPr>
+          <p:cNvSpPr/>
+          <p:nvPr/>
+        </p:nvSpPr>
+        <p:spPr>
+          <a:xfrm>
+            <a:off x="4688908" y="2352689"/>
+            <a:ext cx="1156969" cy="346760"/>
+          </a:xfrm>
+          <a:prstGeom prst="rect">
+            <a:avLst/>
+          </a:prstGeom>
+          <a:ln w="19050">
+            <a:solidFill>
+              <a:srgbClr val="7030A0"/>
+            </a:solidFill>
+          </a:ln>
+          <a:effectLst/>
+        </p:spPr>
+        <p:style>
+          <a:lnRef idx="1">
+            <a:schemeClr val="accent4"/>
+          </a:lnRef>
+          <a:fillRef idx="2">
+            <a:schemeClr val="accent4"/>
+          </a:fillRef>
+          <a:effectRef idx="1">
+            <a:schemeClr val="accent4"/>
+          </a:effectRef>
+          <a:fontRef idx="minor">
+            <a:schemeClr val="dk1"/>
+          </a:fontRef>
+        </p:style>
+        <p:txBody>
+          <a:bodyPr rtlCol="0" anchor="ctr"/>
+          <a:lstStyle/>
+          <a:p>
+            <a:pPr algn="ctr"/>
+            <a:r>
+              <a:rPr lang="en-US" sz="1050" dirty="0" err="1">
+                <a:solidFill>
+                  <a:srgbClr val="7030A0"/>
+                </a:solidFill>
+              </a:rPr>
+              <a:t>UniqueTaskList</a:t>
+            </a:r>
+            <a:endParaRPr lang="en-SG" sz="1050" dirty="0">
+              <a:solidFill>
+                <a:srgbClr val="7030A0"/>
+              </a:solidFill>
+            </a:endParaRPr>
+          </a:p>
+        </p:txBody>
+      </p:sp>
+      <p:sp>
+        <p:nvSpPr>
+          <p:cNvPr id="57" name="Rectangle 8">
+            <a:extLst>
+              <a:ext uri="{FF2B5EF4-FFF2-40B4-BE49-F238E27FC236}">
+                <a16:creationId xmlns:a16="http://schemas.microsoft.com/office/drawing/2014/main" id="{F42C8AC8-6EFA-48E5-9EBB-207EB8FDF98B}"/>
+              </a:ext>
+            </a:extLst>
+          </p:cNvPr>
+          <p:cNvSpPr/>
+          <p:nvPr/>
+        </p:nvSpPr>
+        <p:spPr>
+          <a:xfrm>
+            <a:off x="6309935" y="2364593"/>
+            <a:ext cx="708186" cy="346760"/>
+          </a:xfrm>
+          <a:prstGeom prst="rect">
+            <a:avLst/>
+          </a:prstGeom>
+          <a:ln w="19050">
+            <a:solidFill>
+              <a:srgbClr val="7030A0"/>
+            </a:solidFill>
+          </a:ln>
+          <a:effectLst/>
+        </p:spPr>
+        <p:style>
+          <a:lnRef idx="1">
+            <a:schemeClr val="accent4"/>
+          </a:lnRef>
+          <a:fillRef idx="2">
+            <a:schemeClr val="accent4"/>
+          </a:fillRef>
+          <a:effectRef idx="1">
+            <a:schemeClr val="accent4"/>
+          </a:effectRef>
+          <a:fontRef idx="minor">
+            <a:schemeClr val="dk1"/>
+          </a:fontRef>
+        </p:style>
+        <p:txBody>
+          <a:bodyPr rtlCol="0" anchor="ctr"/>
+          <a:lstStyle/>
+          <a:p>
+            <a:pPr algn="ctr"/>
+            <a:r>
+              <a:rPr lang="en-US" sz="1050" dirty="0">
+                <a:solidFill>
+                  <a:srgbClr val="7030A0"/>
+                </a:solidFill>
+              </a:rPr>
+              <a:t>Task</a:t>
+            </a:r>
+            <a:endParaRPr lang="en-SG" sz="1050" dirty="0">
+              <a:solidFill>
+                <a:srgbClr val="7030A0"/>
+              </a:solidFill>
+            </a:endParaRPr>
+          </a:p>
+        </p:txBody>
+      </p:sp>
+      <p:sp>
+        <p:nvSpPr>
+          <p:cNvPr id="59" name="Flowchart: Decision 96">
+            <a:extLst>
+              <a:ext uri="{FF2B5EF4-FFF2-40B4-BE49-F238E27FC236}">
+                <a16:creationId xmlns:a16="http://schemas.microsoft.com/office/drawing/2014/main" id="{6718C451-F985-4478-A486-0466C8847E42}"/>
+              </a:ext>
+            </a:extLst>
+          </p:cNvPr>
+          <p:cNvSpPr/>
+          <p:nvPr/>
+        </p:nvSpPr>
+        <p:spPr>
+          <a:xfrm>
+            <a:off x="5855009" y="2448203"/>
+            <a:ext cx="236048" cy="173380"/>
+          </a:xfrm>
+          <a:prstGeom prst="flowChartDecision">
+            <a:avLst/>
+          </a:prstGeom>
+          <a:noFill/>
+          <a:ln w="19050">
+            <a:solidFill>
+              <a:srgbClr val="7030A0"/>
+            </a:solidFill>
+          </a:ln>
+          <a:effectLst/>
+        </p:spPr>
+        <p:style>
+          <a:lnRef idx="1">
+            <a:schemeClr val="accent6"/>
+          </a:lnRef>
+          <a:fillRef idx="2">
+            <a:schemeClr val="accent6"/>
+          </a:fillRef>
+          <a:effectRef idx="1">
+            <a:schemeClr val="accent6"/>
+          </a:effectRef>
+          <a:fontRef idx="minor">
+            <a:schemeClr val="dk1"/>
+          </a:fontRef>
+        </p:style>
+        <p:txBody>
+          <a:bodyPr rtlCol="0" anchor="ctr"/>
+          <a:lstStyle/>
+          <a:p>
+            <a:pPr algn="ctr"/>
+            <a:endParaRPr lang="en-US" sz="1050"/>
+          </a:p>
+        </p:txBody>
+      </p:sp>
+      <p:cxnSp>
+        <p:nvCxnSpPr>
+          <p:cNvPr id="67" name="Elbow Connector 63">
+            <a:extLst>
+              <a:ext uri="{FF2B5EF4-FFF2-40B4-BE49-F238E27FC236}">
+                <a16:creationId xmlns:a16="http://schemas.microsoft.com/office/drawing/2014/main" id="{E22ACD9F-20B2-4E59-9F07-E1723441F863}"/>
+              </a:ext>
+            </a:extLst>
+          </p:cNvPr>
+          <p:cNvCxnSpPr>
+            <a:stCxn id="59" idx="3"/>
+            <a:endCxn id="57" idx="1"/>
+          </p:cNvCxnSpPr>
+          <p:nvPr/>
+        </p:nvCxnSpPr>
+        <p:spPr>
+          <a:xfrm>
+            <a:off x="6091057" y="2534893"/>
+            <a:ext cx="218878" cy="3080"/>
+          </a:xfrm>
+          <a:prstGeom prst="bentConnector3">
+            <a:avLst/>
+          </a:prstGeom>
+          <a:ln w="19050">
+            <a:solidFill>
+              <a:srgbClr val="7030A0"/>
+            </a:solidFill>
+            <a:headEnd type="none" w="med" len="med"/>
+            <a:tailEnd type="arrow" w="med" len="med"/>
+          </a:ln>
+          <a:effectLst/>
+        </p:spPr>
+        <p:style>
+          <a:lnRef idx="1">
+            <a:schemeClr val="accent2"/>
+          </a:lnRef>
+          <a:fillRef idx="2">
+            <a:schemeClr val="accent2"/>
+          </a:fillRef>
+          <a:effectRef idx="1">
+            <a:schemeClr val="accent2"/>
+          </a:effectRef>
+          <a:fontRef idx="minor">
+            <a:schemeClr val="dk1"/>
+          </a:fontRef>
+        </p:style>
+      </p:cxnSp>
+      <p:sp>
+        <p:nvSpPr>
+          <p:cNvPr id="71" name="Rectangle 8">
+            <a:extLst>
+              <a:ext uri="{FF2B5EF4-FFF2-40B4-BE49-F238E27FC236}">
+                <a16:creationId xmlns:a16="http://schemas.microsoft.com/office/drawing/2014/main" id="{AF9F10DE-BB32-4A61-B0B7-0B7278E3EACB}"/>
+              </a:ext>
+            </a:extLst>
+          </p:cNvPr>
+          <p:cNvSpPr/>
+          <p:nvPr/>
+        </p:nvSpPr>
+        <p:spPr>
+          <a:xfrm>
+            <a:off x="7708654" y="2070765"/>
+            <a:ext cx="749545" cy="285783"/>
+          </a:xfrm>
+          <a:prstGeom prst="rect">
+            <a:avLst/>
+          </a:prstGeom>
+          <a:ln w="19050">
+            <a:solidFill>
+              <a:srgbClr val="7030A0"/>
+            </a:solidFill>
+          </a:ln>
+          <a:effectLst/>
+        </p:spPr>
+        <p:style>
+          <a:lnRef idx="1">
+            <a:schemeClr val="accent4"/>
+          </a:lnRef>
+          <a:fillRef idx="2">
+            <a:schemeClr val="accent4"/>
+          </a:fillRef>
+          <a:effectRef idx="1">
+            <a:schemeClr val="accent4"/>
+          </a:effectRef>
+          <a:fontRef idx="minor">
+            <a:schemeClr val="dk1"/>
+          </a:fontRef>
+        </p:style>
+        <p:txBody>
+          <a:bodyPr rtlCol="0" anchor="ctr"/>
+          <a:lstStyle/>
+          <a:p>
+            <a:pPr algn="ctr"/>
+            <a:r>
+              <a:rPr lang="en-US" sz="1050" dirty="0">
+                <a:solidFill>
+                  <a:srgbClr val="7030A0"/>
+                </a:solidFill>
+              </a:rPr>
+              <a:t>Name</a:t>
+            </a:r>
+            <a:endParaRPr lang="en-SG" sz="1050" dirty="0">
+              <a:solidFill>
+                <a:srgbClr val="7030A0"/>
+              </a:solidFill>
+            </a:endParaRPr>
+          </a:p>
+        </p:txBody>
+      </p:sp>
+      <p:sp>
+        <p:nvSpPr>
+          <p:cNvPr id="72" name="Flowchart: Decision 96">
+            <a:extLst>
+              <a:ext uri="{FF2B5EF4-FFF2-40B4-BE49-F238E27FC236}">
+                <a16:creationId xmlns:a16="http://schemas.microsoft.com/office/drawing/2014/main" id="{952E1E51-F7DC-4D9F-8C7F-67852D320235}"/>
+              </a:ext>
+            </a:extLst>
+          </p:cNvPr>
+          <p:cNvSpPr/>
+          <p:nvPr/>
+        </p:nvSpPr>
+        <p:spPr>
+          <a:xfrm>
+            <a:off x="7038205" y="2454728"/>
+            <a:ext cx="236048" cy="173380"/>
+          </a:xfrm>
+          <a:prstGeom prst="flowChartDecision">
+            <a:avLst/>
+          </a:prstGeom>
+          <a:solidFill>
+            <a:srgbClr val="7030A0"/>
+          </a:solidFill>
+          <a:ln w="19050">
+            <a:solidFill>
+              <a:srgbClr val="7030A0"/>
+            </a:solidFill>
+          </a:ln>
+          <a:effectLst/>
+        </p:spPr>
+        <p:style>
+          <a:lnRef idx="1">
+            <a:schemeClr val="accent6"/>
+          </a:lnRef>
+          <a:fillRef idx="2">
+            <a:schemeClr val="accent6"/>
+          </a:fillRef>
+          <a:effectRef idx="1">
+            <a:schemeClr val="accent6"/>
+          </a:effectRef>
+          <a:fontRef idx="minor">
+            <a:schemeClr val="dk1"/>
+          </a:fontRef>
+        </p:style>
+        <p:txBody>
+          <a:bodyPr rtlCol="0" anchor="ctr"/>
+          <a:lstStyle/>
+          <a:p>
+            <a:pPr algn="ctr"/>
+            <a:endParaRPr lang="en-US" sz="1050"/>
+          </a:p>
+        </p:txBody>
+      </p:sp>
+      <p:cxnSp>
+        <p:nvCxnSpPr>
+          <p:cNvPr id="73" name="Elbow Connector 78">
+            <a:extLst>
+              <a:ext uri="{FF2B5EF4-FFF2-40B4-BE49-F238E27FC236}">
+                <a16:creationId xmlns:a16="http://schemas.microsoft.com/office/drawing/2014/main" id="{57C8648E-B50B-498E-9C80-7315084A382C}"/>
+              </a:ext>
+            </a:extLst>
+          </p:cNvPr>
+          <p:cNvCxnSpPr>
+            <a:cxnSpLocks/>
+          </p:cNvCxnSpPr>
+          <p:nvPr/>
+        </p:nvCxnSpPr>
+        <p:spPr>
+          <a:xfrm flipV="1">
+            <a:off x="7274253" y="2213348"/>
+            <a:ext cx="434402" cy="327761"/>
+          </a:xfrm>
+          <a:prstGeom prst="bentConnector3">
+            <a:avLst/>
+          </a:prstGeom>
+          <a:ln w="19050">
+            <a:solidFill>
+              <a:srgbClr val="7030A0"/>
+            </a:solidFill>
+            <a:headEnd type="none" w="med" len="med"/>
+            <a:tailEnd type="arrow" w="med" len="med"/>
+          </a:ln>
+          <a:effectLst/>
+        </p:spPr>
+        <p:style>
+          <a:lnRef idx="1">
+            <a:schemeClr val="accent2"/>
+          </a:lnRef>
+          <a:fillRef idx="2">
+            <a:schemeClr val="accent2"/>
+          </a:fillRef>
+          <a:effectRef idx="1">
+            <a:schemeClr val="accent2"/>
+          </a:effectRef>
+          <a:fontRef idx="minor">
+            <a:schemeClr val="dk1"/>
+          </a:fontRef>
+        </p:style>
+      </p:cxnSp>
+      <p:sp>
+        <p:nvSpPr>
+          <p:cNvPr id="74" name="Rectangle 8">
+            <a:extLst>
+              <a:ext uri="{FF2B5EF4-FFF2-40B4-BE49-F238E27FC236}">
+                <a16:creationId xmlns:a16="http://schemas.microsoft.com/office/drawing/2014/main" id="{76DDEC4B-985A-4332-A4B6-984D2FEDB264}"/>
+              </a:ext>
+            </a:extLst>
+          </p:cNvPr>
+          <p:cNvSpPr/>
+          <p:nvPr/>
+        </p:nvSpPr>
+        <p:spPr>
+          <a:xfrm>
+            <a:off x="7706169" y="2401145"/>
+            <a:ext cx="749545" cy="285783"/>
+          </a:xfrm>
+          <a:prstGeom prst="rect">
+            <a:avLst/>
+          </a:prstGeom>
+          <a:ln w="19050">
+            <a:solidFill>
+              <a:srgbClr val="7030A0"/>
+            </a:solidFill>
+          </a:ln>
+          <a:effectLst/>
+        </p:spPr>
+        <p:style>
+          <a:lnRef idx="1">
+            <a:schemeClr val="accent4"/>
+          </a:lnRef>
+          <a:fillRef idx="2">
+            <a:schemeClr val="accent4"/>
+          </a:fillRef>
+          <a:effectRef idx="1">
+            <a:schemeClr val="accent4"/>
+          </a:effectRef>
+          <a:fontRef idx="minor">
+            <a:schemeClr val="dk1"/>
+          </a:fontRef>
+        </p:style>
+        <p:txBody>
+          <a:bodyPr rtlCol="0" anchor="ctr"/>
+          <a:lstStyle/>
+          <a:p>
+            <a:pPr algn="ctr"/>
+            <a:r>
+              <a:rPr lang="en-US" sz="1050" dirty="0" err="1">
+                <a:solidFill>
+                  <a:srgbClr val="7030A0"/>
+                </a:solidFill>
+              </a:rPr>
+              <a:t>DateTime</a:t>
+            </a:r>
+            <a:endParaRPr lang="en-SG" sz="1050" dirty="0">
+              <a:solidFill>
+                <a:srgbClr val="7030A0"/>
+              </a:solidFill>
+            </a:endParaRPr>
+          </a:p>
+        </p:txBody>
+      </p:sp>
+      <p:cxnSp>
+        <p:nvCxnSpPr>
+          <p:cNvPr id="77" name="Elbow Connector 80">
+            <a:extLst>
+              <a:ext uri="{FF2B5EF4-FFF2-40B4-BE49-F238E27FC236}">
+                <a16:creationId xmlns:a16="http://schemas.microsoft.com/office/drawing/2014/main" id="{4CAEEDA0-8DB9-4CB8-9061-58129E4DA750}"/>
+              </a:ext>
+            </a:extLst>
+          </p:cNvPr>
+          <p:cNvCxnSpPr>
+            <a:cxnSpLocks/>
+            <a:stCxn id="72" idx="3"/>
+            <a:endCxn id="74" idx="1"/>
+          </p:cNvCxnSpPr>
+          <p:nvPr/>
+        </p:nvCxnSpPr>
+        <p:spPr>
+          <a:xfrm>
+            <a:off x="7274253" y="2541418"/>
+            <a:ext cx="431916" cy="2619"/>
+          </a:xfrm>
+          <a:prstGeom prst="bentConnector3">
+            <a:avLst/>
+          </a:prstGeom>
+          <a:ln w="19050">
+            <a:solidFill>
+              <a:srgbClr val="7030A0"/>
+            </a:solidFill>
+            <a:headEnd type="none" w="med" len="med"/>
+            <a:tailEnd type="arrow" w="med" len="med"/>
+          </a:ln>
+          <a:effectLst/>
+        </p:spPr>
+        <p:style>
+          <a:lnRef idx="1">
+            <a:schemeClr val="accent2"/>
+          </a:lnRef>
+          <a:fillRef idx="2">
+            <a:schemeClr val="accent2"/>
+          </a:fillRef>
+          <a:effectRef idx="1">
+            <a:schemeClr val="accent2"/>
+          </a:effectRef>
+          <a:fontRef idx="minor">
+            <a:schemeClr val="dk1"/>
+          </a:fontRef>
+        </p:style>
+      </p:cxnSp>
+      <p:sp>
+        <p:nvSpPr>
+          <p:cNvPr id="82" name="Rectangle 8">
+            <a:extLst>
+              <a:ext uri="{FF2B5EF4-FFF2-40B4-BE49-F238E27FC236}">
+                <a16:creationId xmlns:a16="http://schemas.microsoft.com/office/drawing/2014/main" id="{335DFF67-6392-4704-B5B8-D60C39CD350A}"/>
+              </a:ext>
+            </a:extLst>
+          </p:cNvPr>
+          <p:cNvSpPr/>
+          <p:nvPr/>
+        </p:nvSpPr>
+        <p:spPr>
+          <a:xfrm>
+            <a:off x="7708654" y="1735344"/>
+            <a:ext cx="749545" cy="285783"/>
+          </a:xfrm>
+          <a:prstGeom prst="rect">
+            <a:avLst/>
+          </a:prstGeom>
+          <a:ln w="19050">
+            <a:solidFill>
+              <a:srgbClr val="7030A0"/>
+            </a:solidFill>
+          </a:ln>
+          <a:effectLst/>
+        </p:spPr>
+        <p:style>
+          <a:lnRef idx="1">
+            <a:schemeClr val="accent4"/>
+          </a:lnRef>
+          <a:fillRef idx="2">
+            <a:schemeClr val="accent4"/>
+          </a:fillRef>
+          <a:effectRef idx="1">
+            <a:schemeClr val="accent4"/>
+          </a:effectRef>
+          <a:fontRef idx="minor">
+            <a:schemeClr val="dk1"/>
+          </a:fontRef>
+        </p:style>
+        <p:txBody>
+          <a:bodyPr rtlCol="0" anchor="ctr"/>
+          <a:lstStyle/>
+          <a:p>
+            <a:pPr algn="ctr"/>
+            <a:r>
+              <a:rPr lang="en-US" sz="1050" dirty="0">
+                <a:solidFill>
+                  <a:srgbClr val="7030A0"/>
+                </a:solidFill>
+              </a:rPr>
+              <a:t>Tag</a:t>
+            </a:r>
+            <a:endParaRPr lang="en-SG" sz="1050" dirty="0">
+              <a:solidFill>
+                <a:srgbClr val="7030A0"/>
+              </a:solidFill>
+            </a:endParaRPr>
+          </a:p>
+        </p:txBody>
+      </p:sp>
+      <p:cxnSp>
+        <p:nvCxnSpPr>
+          <p:cNvPr id="87" name="Elbow Connector 78">
+            <a:extLst>
+              <a:ext uri="{FF2B5EF4-FFF2-40B4-BE49-F238E27FC236}">
+                <a16:creationId xmlns:a16="http://schemas.microsoft.com/office/drawing/2014/main" id="{846AAD1D-E35C-4C43-B9B1-CB1699B020DE}"/>
+              </a:ext>
+            </a:extLst>
+          </p:cNvPr>
+          <p:cNvCxnSpPr>
+            <a:cxnSpLocks/>
+            <a:stCxn id="72" idx="3"/>
+            <a:endCxn id="82" idx="1"/>
+          </p:cNvCxnSpPr>
+          <p:nvPr/>
+        </p:nvCxnSpPr>
+        <p:spPr>
+          <a:xfrm flipV="1">
+            <a:off x="7274253" y="1878236"/>
+            <a:ext cx="434401" cy="663182"/>
+          </a:xfrm>
+          <a:prstGeom prst="bentConnector3">
+            <a:avLst>
+              <a:gd name="adj1" fmla="val 50000"/>
+            </a:avLst>
+          </a:prstGeom>
+          <a:ln w="19050">
+            <a:solidFill>
+              <a:srgbClr val="7030A0"/>
+            </a:solidFill>
+            <a:headEnd type="none" w="med" len="med"/>
+            <a:tailEnd type="arrow" w="med" len="med"/>
+          </a:ln>
+          <a:effectLst/>
+        </p:spPr>
+        <p:style>
+          <a:lnRef idx="1">
+            <a:schemeClr val="accent2"/>
+          </a:lnRef>
+          <a:fillRef idx="2">
+            <a:schemeClr val="accent2"/>
+          </a:fillRef>
+          <a:effectRef idx="1">
+            <a:schemeClr val="accent2"/>
+          </a:effectRef>
+          <a:fontRef idx="minor">
+            <a:schemeClr val="dk1"/>
+          </a:fontRef>
+        </p:style>
+      </p:cxnSp>
+      <p:sp>
+        <p:nvSpPr>
+          <p:cNvPr id="88" name="TextBox 87">
+            <a:extLst>
+              <a:ext uri="{FF2B5EF4-FFF2-40B4-BE49-F238E27FC236}">
+                <a16:creationId xmlns:a16="http://schemas.microsoft.com/office/drawing/2014/main" id="{A819264A-B9E5-44C0-921D-02308553E539}"/>
+              </a:ext>
+            </a:extLst>
+          </p:cNvPr>
+          <p:cNvSpPr txBox="1"/>
+          <p:nvPr/>
+        </p:nvSpPr>
+        <p:spPr>
+          <a:xfrm>
+            <a:off x="7462501" y="1762238"/>
+            <a:ext cx="189257" cy="178683"/>
+          </a:xfrm>
+          <a:prstGeom prst="rect">
+            <a:avLst/>
+          </a:prstGeom>
+          <a:noFill/>
+        </p:spPr>
+        <p:txBody>
+          <a:bodyPr wrap="square" lIns="0" tIns="0" rIns="0" bIns="0" rtlCol="0">
+            <a:noAutofit/>
+          </a:bodyPr>
+          <a:lstStyle/>
+          <a:p>
+            <a:pPr algn="ctr"/>
+            <a:r>
+              <a:rPr lang="en-US" sz="1100" dirty="0">
+                <a:solidFill>
+                  <a:srgbClr val="7030A0"/>
+                </a:solidFill>
+              </a:rPr>
+              <a:t>*</a:t>
+            </a:r>
+            <a:endParaRPr lang="en-SG" sz="1100" dirty="0">
+              <a:solidFill>
+                <a:srgbClr val="7030A0"/>
+              </a:solidFill>
+            </a:endParaRPr>
+          </a:p>
+        </p:txBody>
+      </p:sp>
+      <p:cxnSp>
+        <p:nvCxnSpPr>
+          <p:cNvPr id="89" name="Straight Arrow Connector 59">
+            <a:extLst>
+              <a:ext uri="{FF2B5EF4-FFF2-40B4-BE49-F238E27FC236}">
+                <a16:creationId xmlns:a16="http://schemas.microsoft.com/office/drawing/2014/main" id="{7D4ED7F7-C891-4411-8374-D5A7D6439D6B}"/>
+              </a:ext>
+            </a:extLst>
+          </p:cNvPr>
+          <p:cNvCxnSpPr>
+            <a:cxnSpLocks/>
+            <a:endCxn id="56" idx="1"/>
+          </p:cNvCxnSpPr>
+          <p:nvPr/>
+        </p:nvCxnSpPr>
+        <p:spPr>
+          <a:xfrm rot="5400000" flipH="1" flipV="1">
+            <a:off x="4383552" y="2597610"/>
+            <a:ext cx="376896" cy="233815"/>
+          </a:xfrm>
+          <a:prstGeom prst="bentConnector2">
+            <a:avLst/>
+          </a:prstGeom>
+          <a:ln w="19050">
+            <a:solidFill>
+              <a:srgbClr val="7030A0"/>
+            </a:solidFill>
+            <a:headEnd type="none" w="med" len="med"/>
+            <a:tailEnd type="arrow" w="med" len="med"/>
+          </a:ln>
+          <a:effectLst/>
+        </p:spPr>
+        <p:style>
+          <a:lnRef idx="1">
+            <a:schemeClr val="accent2"/>
+          </a:lnRef>
+          <a:fillRef idx="2">
+            <a:schemeClr val="accent2"/>
+          </a:fillRef>
+          <a:effectRef idx="1">
+            <a:schemeClr val="accent2"/>
+          </a:effectRef>
+          <a:fontRef idx="minor">
+            <a:schemeClr val="dk1"/>
+          </a:fontRef>
+        </p:style>
+      </p:cxnSp>
+      <p:sp>
+        <p:nvSpPr>
+          <p:cNvPr id="90" name="TextBox 89">
+            <a:extLst>
+              <a:ext uri="{FF2B5EF4-FFF2-40B4-BE49-F238E27FC236}">
+                <a16:creationId xmlns:a16="http://schemas.microsoft.com/office/drawing/2014/main" id="{76658B31-94F4-4513-AA76-C832BC1D4E06}"/>
+              </a:ext>
+            </a:extLst>
+          </p:cNvPr>
+          <p:cNvSpPr txBox="1"/>
+          <p:nvPr/>
+        </p:nvSpPr>
+        <p:spPr>
+          <a:xfrm>
+            <a:off x="4426532" y="2710409"/>
+            <a:ext cx="189257" cy="178683"/>
+          </a:xfrm>
+          <a:prstGeom prst="rect">
+            <a:avLst/>
+          </a:prstGeom>
+          <a:noFill/>
+        </p:spPr>
+        <p:txBody>
+          <a:bodyPr wrap="square" lIns="0" tIns="0" rIns="0" bIns="0" rtlCol="0">
+            <a:noAutofit/>
+          </a:bodyPr>
+          <a:lstStyle/>
+          <a:p>
+            <a:pPr algn="ctr"/>
+            <a:r>
+              <a:rPr lang="en-US" sz="1100" dirty="0">
+                <a:solidFill>
+                  <a:srgbClr val="7030A0"/>
+                </a:solidFill>
+              </a:rPr>
+              <a:t>1</a:t>
+            </a:r>
+            <a:endParaRPr lang="en-SG" sz="1100" dirty="0">
+              <a:solidFill>
+                <a:srgbClr val="7030A0"/>
+              </a:solidFill>
+            </a:endParaRPr>
+          </a:p>
+        </p:txBody>
+      </p:sp>
+      <p:cxnSp>
+        <p:nvCxnSpPr>
+          <p:cNvPr id="91" name="Straight Arrow Connector 59">
+            <a:extLst>
+              <a:ext uri="{FF2B5EF4-FFF2-40B4-BE49-F238E27FC236}">
+                <a16:creationId xmlns:a16="http://schemas.microsoft.com/office/drawing/2014/main" id="{DFA9D6FC-69F9-476D-8A54-44BFD7704593}"/>
+              </a:ext>
+            </a:extLst>
+          </p:cNvPr>
+          <p:cNvCxnSpPr>
+            <a:cxnSpLocks/>
+            <a:endCxn id="57" idx="2"/>
+          </p:cNvCxnSpPr>
+          <p:nvPr/>
+        </p:nvCxnSpPr>
+        <p:spPr>
+          <a:xfrm rot="5400000" flipH="1" flipV="1">
+            <a:off x="5733434" y="3139197"/>
+            <a:ext cx="1358438" cy="502750"/>
+          </a:xfrm>
+          <a:prstGeom prst="bentConnector3">
+            <a:avLst>
+              <a:gd name="adj1" fmla="val 50000"/>
+            </a:avLst>
+          </a:prstGeom>
+          <a:ln w="19050">
+            <a:solidFill>
+              <a:srgbClr val="7030A0"/>
+            </a:solidFill>
+            <a:headEnd type="none" w="med" len="med"/>
+            <a:tailEnd type="arrow" w="med" len="med"/>
+          </a:ln>
+          <a:effectLst/>
+        </p:spPr>
+        <p:style>
+          <a:lnRef idx="1">
+            <a:schemeClr val="accent2"/>
+          </a:lnRef>
+          <a:fillRef idx="2">
+            <a:schemeClr val="accent2"/>
+          </a:fillRef>
+          <a:effectRef idx="1">
+            <a:schemeClr val="accent2"/>
+          </a:effectRef>
+          <a:fontRef idx="minor">
+            <a:schemeClr val="dk1"/>
+          </a:fontRef>
+        </p:style>
+      </p:cxnSp>
+      <p:sp>
+        <p:nvSpPr>
+          <p:cNvPr id="92" name="TextBox 91">
+            <a:extLst>
+              <a:ext uri="{FF2B5EF4-FFF2-40B4-BE49-F238E27FC236}">
+                <a16:creationId xmlns:a16="http://schemas.microsoft.com/office/drawing/2014/main" id="{C0509077-423F-413B-87D0-0C05CA518882}"/>
+              </a:ext>
+            </a:extLst>
+          </p:cNvPr>
+          <p:cNvSpPr txBox="1"/>
+          <p:nvPr/>
+        </p:nvSpPr>
+        <p:spPr>
+          <a:xfrm rot="16200000">
+            <a:off x="6387657" y="2984739"/>
+            <a:ext cx="881018" cy="261610"/>
+          </a:xfrm>
+          <a:prstGeom prst="rect">
+            <a:avLst/>
+          </a:prstGeom>
+          <a:noFill/>
+        </p:spPr>
+        <p:txBody>
+          <a:bodyPr wrap="square" rtlCol="0">
+            <a:spAutoFit/>
+          </a:bodyPr>
+          <a:lstStyle/>
+          <a:p>
+            <a:pPr algn="r"/>
+            <a:r>
+              <a:rPr lang="en-US" sz="1100" dirty="0">
+                <a:solidFill>
+                  <a:srgbClr val="7030A0"/>
+                </a:solidFill>
+              </a:rPr>
+              <a:t>filtered list</a:t>
+            </a:r>
+            <a:endParaRPr lang="en-SG" sz="1100" dirty="0">
+              <a:solidFill>
+                <a:srgbClr val="7030A0"/>
+              </a:solidFill>
+            </a:endParaRPr>
+          </a:p>
+        </p:txBody>
+      </p:sp>
+      <p:sp>
+        <p:nvSpPr>
+          <p:cNvPr id="93" name="TextBox 92">
+            <a:extLst>
+              <a:ext uri="{FF2B5EF4-FFF2-40B4-BE49-F238E27FC236}">
+                <a16:creationId xmlns:a16="http://schemas.microsoft.com/office/drawing/2014/main" id="{1BABAE06-65A2-47E7-B022-5D29A898FC0B}"/>
+              </a:ext>
+            </a:extLst>
+          </p:cNvPr>
+          <p:cNvSpPr txBox="1"/>
+          <p:nvPr/>
+        </p:nvSpPr>
+        <p:spPr>
+          <a:xfrm>
+            <a:off x="6439717" y="2736144"/>
+            <a:ext cx="189257" cy="178683"/>
+          </a:xfrm>
+          <a:prstGeom prst="rect">
+            <a:avLst/>
+          </a:prstGeom>
+          <a:noFill/>
+        </p:spPr>
+        <p:txBody>
+          <a:bodyPr wrap="square" lIns="0" tIns="0" rIns="0" bIns="0" rtlCol="0">
+            <a:noAutofit/>
+          </a:bodyPr>
+          <a:lstStyle/>
+          <a:p>
+            <a:pPr algn="ctr"/>
+            <a:r>
+              <a:rPr lang="en-US" sz="1100" dirty="0">
+                <a:solidFill>
+                  <a:srgbClr val="7030A0"/>
+                </a:solidFill>
+              </a:rPr>
+              <a:t>1</a:t>
+            </a:r>
+            <a:endParaRPr lang="en-SG" sz="1100" dirty="0">
+              <a:solidFill>
+                <a:srgbClr val="7030A0"/>
+              </a:solidFill>
+            </a:endParaRPr>
+          </a:p>
+        </p:txBody>
+      </p:sp>
     </p:spTree>
     <p:extLst>
       <p:ext uri="{BB962C8B-B14F-4D97-AF65-F5344CB8AC3E}">

</xml_diff>